<commit_message>
Update CS 25-347_Poster Rough Draft.pptx
</commit_message>
<xml_diff>
--- a/Project Deliverables/CS 25-347_Poster Rough Draft.pptx
+++ b/Project Deliverables/CS 25-347_Poster Rough Draft.pptx
@@ -208,7 +208,7 @@
           <a:p>
             <a:fld id="{C605AE8F-D750-4DFF-B786-EB33F602B7F0}" type="datetimeFigureOut">
               <a:rPr lang="en-US" smtClean="0"/>
-              <a:t>11/13/24</a:t>
+              <a:t>11/14/2024</a:t>
             </a:fld>
             <a:endParaRPr lang="en-US"/>
           </a:p>
@@ -606,7 +606,7 @@
           <a:p>
             <a:fld id="{C764DE79-268F-4C1A-8933-263129D2AF90}" type="datetimeFigureOut">
               <a:rPr lang="en-US" dirty="0"/>
-              <a:t>11/13/24</a:t>
+              <a:t>11/14/2024</a:t>
             </a:fld>
             <a:endParaRPr lang="en-US" dirty="0"/>
           </a:p>
@@ -776,7 +776,7 @@
           <a:p>
             <a:fld id="{C764DE79-268F-4C1A-8933-263129D2AF90}" type="datetimeFigureOut">
               <a:rPr lang="en-US" dirty="0"/>
-              <a:t>11/13/24</a:t>
+              <a:t>11/14/2024</a:t>
             </a:fld>
             <a:endParaRPr lang="en-US" dirty="0"/>
           </a:p>
@@ -956,7 +956,7 @@
           <a:p>
             <a:fld id="{C764DE79-268F-4C1A-8933-263129D2AF90}" type="datetimeFigureOut">
               <a:rPr lang="en-US" dirty="0"/>
-              <a:t>11/13/24</a:t>
+              <a:t>11/14/2024</a:t>
             </a:fld>
             <a:endParaRPr lang="en-US" dirty="0"/>
           </a:p>
@@ -1262,7 +1262,7 @@
           <a:p>
             <a:fld id="{C764DE79-268F-4C1A-8933-263129D2AF90}" type="datetimeFigureOut">
               <a:rPr lang="en-US" dirty="0"/>
-              <a:t>11/13/24</a:t>
+              <a:t>11/14/2024</a:t>
             </a:fld>
             <a:endParaRPr lang="en-US" dirty="0"/>
           </a:p>
@@ -1506,7 +1506,7 @@
           <a:p>
             <a:fld id="{C764DE79-268F-4C1A-8933-263129D2AF90}" type="datetimeFigureOut">
               <a:rPr lang="en-US" dirty="0"/>
-              <a:t>11/13/24</a:t>
+              <a:t>11/14/2024</a:t>
             </a:fld>
             <a:endParaRPr lang="en-US" dirty="0"/>
           </a:p>
@@ -1738,7 +1738,7 @@
           <a:p>
             <a:fld id="{C764DE79-268F-4C1A-8933-263129D2AF90}" type="datetimeFigureOut">
               <a:rPr lang="en-US" dirty="0"/>
-              <a:t>11/13/24</a:t>
+              <a:t>11/14/2024</a:t>
             </a:fld>
             <a:endParaRPr lang="en-US" dirty="0"/>
           </a:p>
@@ -2105,7 +2105,7 @@
           <a:p>
             <a:fld id="{C764DE79-268F-4C1A-8933-263129D2AF90}" type="datetimeFigureOut">
               <a:rPr lang="en-US" dirty="0"/>
-              <a:t>11/13/24</a:t>
+              <a:t>11/14/2024</a:t>
             </a:fld>
             <a:endParaRPr lang="en-US" dirty="0"/>
           </a:p>
@@ -2223,7 +2223,7 @@
           <a:p>
             <a:fld id="{C764DE79-268F-4C1A-8933-263129D2AF90}" type="datetimeFigureOut">
               <a:rPr lang="en-US" dirty="0"/>
-              <a:t>11/13/24</a:t>
+              <a:t>11/14/2024</a:t>
             </a:fld>
             <a:endParaRPr lang="en-US" dirty="0"/>
           </a:p>
@@ -2318,7 +2318,7 @@
           <a:p>
             <a:fld id="{C764DE79-268F-4C1A-8933-263129D2AF90}" type="datetimeFigureOut">
               <a:rPr lang="en-US" dirty="0"/>
-              <a:t>11/13/24</a:t>
+              <a:t>11/14/2024</a:t>
             </a:fld>
             <a:endParaRPr lang="en-US" dirty="0"/>
           </a:p>
@@ -2595,7 +2595,7 @@
           <a:p>
             <a:fld id="{C764DE79-268F-4C1A-8933-263129D2AF90}" type="datetimeFigureOut">
               <a:rPr lang="en-US" dirty="0"/>
-              <a:t>11/13/24</a:t>
+              <a:t>11/14/2024</a:t>
             </a:fld>
             <a:endParaRPr lang="en-US" dirty="0"/>
           </a:p>
@@ -2852,7 +2852,7 @@
           <a:p>
             <a:fld id="{C764DE79-268F-4C1A-8933-263129D2AF90}" type="datetimeFigureOut">
               <a:rPr lang="en-US" dirty="0"/>
-              <a:t>11/13/24</a:t>
+              <a:t>11/14/2024</a:t>
             </a:fld>
             <a:endParaRPr lang="en-US" dirty="0"/>
           </a:p>
@@ -3065,7 +3065,7 @@
           <a:p>
             <a:fld id="{C764DE79-268F-4C1A-8933-263129D2AF90}" type="datetimeFigureOut">
               <a:rPr lang="en-US" dirty="0"/>
-              <a:t>11/13/24</a:t>
+              <a:t>11/14/2024</a:t>
             </a:fld>
             <a:endParaRPr lang="en-US" dirty="0"/>
           </a:p>
@@ -3946,7 +3946,7 @@
         <p:spPr>
           <a:xfrm>
             <a:off x="12344398" y="5954876"/>
-            <a:ext cx="18288000" cy="18288000"/>
+            <a:ext cx="20116800" cy="16459200"/>
           </a:xfrm>
           <a:prstGeom prst="roundRect">
             <a:avLst>
@@ -4015,6 +4015,66 @@
       </p:sp>
       <p:sp>
         <p:nvSpPr>
+          <p:cNvPr id="31" name="Rectangle: Rounded Corners 30">
+            <a:extLst>
+              <a:ext uri="{FF2B5EF4-FFF2-40B4-BE49-F238E27FC236}">
+                <a16:creationId xmlns:a16="http://schemas.microsoft.com/office/drawing/2014/main" id="{F29EA7DA-8DB8-0AD2-6398-3809103A7F69}"/>
+              </a:ext>
+            </a:extLst>
+          </p:cNvPr>
+          <p:cNvSpPr/>
+          <p:nvPr/>
+        </p:nvSpPr>
+        <p:spPr>
+          <a:xfrm>
+            <a:off x="12938369" y="7808299"/>
+            <a:ext cx="7315200" cy="13716000"/>
+          </a:xfrm>
+          <a:prstGeom prst="roundRect">
+            <a:avLst>
+              <a:gd name="adj" fmla="val 4663"/>
+            </a:avLst>
+          </a:prstGeom>
+          <a:solidFill>
+            <a:schemeClr val="bg1"/>
+          </a:solidFill>
+        </p:spPr>
+        <p:style>
+          <a:lnRef idx="2">
+            <a:schemeClr val="accent1">
+              <a:shade val="15000"/>
+            </a:schemeClr>
+          </a:lnRef>
+          <a:fillRef idx="1">
+            <a:schemeClr val="accent1"/>
+          </a:fillRef>
+          <a:effectRef idx="0">
+            <a:schemeClr val="accent1"/>
+          </a:effectRef>
+          <a:fontRef idx="minor">
+            <a:schemeClr val="lt1"/>
+          </a:fontRef>
+        </p:style>
+        <p:txBody>
+          <a:bodyPr lIns="457200" tIns="457200" rIns="457200" bIns="457200" rtlCol="0" anchor="t" anchorCtr="0"/>
+          <a:lstStyle/>
+          <a:p>
+            <a:pPr algn="ctr"/>
+            <a:r>
+              <a:rPr lang="en-US" sz="4800" b="1" dirty="0">
+                <a:solidFill>
+                  <a:schemeClr val="tx1"/>
+                </a:solidFill>
+                <a:latin typeface="Arial" panose="020B0604020202020204" pitchFamily="34" charset="0"/>
+                <a:cs typeface="Arial" panose="020B0604020202020204" pitchFamily="34" charset="0"/>
+              </a:rPr>
+              <a:t>Real World</a:t>
+            </a:r>
+          </a:p>
+        </p:txBody>
+      </p:sp>
+      <p:sp>
+        <p:nvSpPr>
           <p:cNvPr id="16" name="Rectangle: Rounded Corners 15">
             <a:extLst>
               <a:ext uri="{FF2B5EF4-FFF2-40B4-BE49-F238E27FC236}">
@@ -4027,8 +4087,8 @@
         </p:nvSpPr>
         <p:spPr>
           <a:xfrm>
-            <a:off x="32308801" y="5943600"/>
-            <a:ext cx="10972800" cy="8643257"/>
+            <a:off x="33183871" y="5943601"/>
+            <a:ext cx="10058404" cy="6781800"/>
           </a:xfrm>
           <a:prstGeom prst="roundRect">
             <a:avLst>
@@ -4203,8 +4263,8 @@
         </p:nvSpPr>
         <p:spPr>
           <a:xfrm>
-            <a:off x="32308801" y="15932589"/>
-            <a:ext cx="10972800" cy="8310287"/>
+            <a:off x="33183871" y="13414885"/>
+            <a:ext cx="10058404" cy="8999191"/>
           </a:xfrm>
           <a:prstGeom prst="roundRect">
             <a:avLst>
@@ -4432,54 +4492,6 @@
           <a:effectLst/>
         </p:spPr>
       </p:pic>
-      <p:pic>
-        <p:nvPicPr>
-          <p:cNvPr id="1030" name="Picture 6" descr="ABB CRB 15000 robot - RoboDK">
-            <a:extLst>
-              <a:ext uri="{FF2B5EF4-FFF2-40B4-BE49-F238E27FC236}">
-                <a16:creationId xmlns:a16="http://schemas.microsoft.com/office/drawing/2014/main" id="{801D4DA4-8CC1-FDCB-3C5D-35EEECE687F3}"/>
-              </a:ext>
-            </a:extLst>
-          </p:cNvPr>
-          <p:cNvPicPr>
-            <a:picLocks noChangeAspect="1" noChangeArrowheads="1"/>
-          </p:cNvPicPr>
-          <p:nvPr/>
-        </p:nvPicPr>
-        <p:blipFill>
-          <a:blip r:embed="rId3">
-            <a:extLst>
-              <a:ext uri="{28A0092B-C50C-407E-A947-70E740481C1C}">
-                <a14:useLocalDpi xmlns:a14="http://schemas.microsoft.com/office/drawing/2010/main" val="0"/>
-              </a:ext>
-            </a:extLst>
-          </a:blip>
-          <a:srcRect/>
-          <a:stretch>
-            <a:fillRect/>
-          </a:stretch>
-        </p:blipFill>
-        <p:spPr bwMode="auto">
-          <a:xfrm>
-            <a:off x="20632649" y="12237709"/>
-            <a:ext cx="9999750" cy="11428285"/>
-          </a:xfrm>
-          <a:prstGeom prst="rect">
-            <a:avLst/>
-          </a:prstGeom>
-          <a:noFill/>
-          <a:effectLst/>
-          <a:extLst>
-            <a:ext uri="{909E8E84-426E-40DD-AFC4-6F175D3DCCD1}">
-              <a14:hiddenFill xmlns:a14="http://schemas.microsoft.com/office/drawing/2010/main">
-                <a:solidFill>
-                  <a:srgbClr val="FFFFFF"/>
-                </a:solidFill>
-              </a14:hiddenFill>
-            </a:ext>
-          </a:extLst>
-        </p:spPr>
-      </p:pic>
       <p:sp>
         <p:nvSpPr>
           <p:cNvPr id="11" name="TextBox 10">
@@ -4494,8 +4506,8 @@
         </p:nvSpPr>
         <p:spPr>
           <a:xfrm>
-            <a:off x="12793754" y="9906541"/>
-            <a:ext cx="9509758" cy="1938992"/>
+            <a:off x="13652765" y="19753931"/>
+            <a:ext cx="5798434" cy="1384995"/>
           </a:xfrm>
           <a:prstGeom prst="rect">
             <a:avLst/>
@@ -4508,21 +4520,23 @@
           </a:bodyPr>
           <a:lstStyle/>
           <a:p>
+            <a:pPr algn="ctr"/>
             <a:r>
               <a:rPr lang="en-US" sz="4800" b="1" dirty="0">
                 <a:latin typeface="Arial" panose="020B0604020202020204" pitchFamily="34" charset="0"/>
                 <a:cs typeface="Arial" panose="020B0604020202020204" pitchFamily="34" charset="0"/>
               </a:rPr>
-              <a:t>Intel RealSense D455</a:t>
-            </a:r>
-          </a:p>
-          <a:p>
+              <a:t>RealSense Camera</a:t>
+            </a:r>
+          </a:p>
+          <a:p>
+            <a:pPr algn="ctr"/>
             <a:r>
               <a:rPr lang="en-US" sz="3600" dirty="0">
                 <a:latin typeface="Arial" panose="020B0604020202020204" pitchFamily="34" charset="0"/>
                 <a:cs typeface="Arial" panose="020B0604020202020204" pitchFamily="34" charset="0"/>
               </a:rPr>
-              <a:t>High-spec dual camera + depth sensor used to aid the robot in sensing the environment.</a:t>
+              <a:t>Depth &amp; RGB Data</a:t>
             </a:r>
           </a:p>
         </p:txBody>
@@ -4542,7 +4556,7 @@
           <p:nvPr/>
         </p:nvPicPr>
         <p:blipFill rotWithShape="1">
-          <a:blip r:embed="rId4">
+          <a:blip r:embed="rId3">
             <a:extLst>
               <a:ext uri="{28A0092B-C50C-407E-A947-70E740481C1C}">
                 <a14:useLocalDpi xmlns:a14="http://schemas.microsoft.com/office/drawing/2010/main" val="0"/>
@@ -4554,8 +4568,8 @@
         </p:blipFill>
         <p:spPr bwMode="auto">
           <a:xfrm>
-            <a:off x="12176369" y="7652722"/>
-            <a:ext cx="8456279" cy="2305050"/>
+            <a:off x="14302266" y="18336037"/>
+            <a:ext cx="4572000" cy="1246256"/>
           </a:xfrm>
           <a:prstGeom prst="rect">
             <a:avLst/>
@@ -4572,203 +4586,6 @@
           </a:extLst>
         </p:spPr>
       </p:pic>
-      <p:pic>
-        <p:nvPicPr>
-          <p:cNvPr id="1034" name="Picture 10" descr="Nvidia Logo - PNG y Vector">
-            <a:extLst>
-              <a:ext uri="{FF2B5EF4-FFF2-40B4-BE49-F238E27FC236}">
-                <a16:creationId xmlns:a16="http://schemas.microsoft.com/office/drawing/2014/main" id="{83B7F37D-931E-DF97-C9E8-FFA8D855175B}"/>
-              </a:ext>
-            </a:extLst>
-          </p:cNvPr>
-          <p:cNvPicPr>
-            <a:picLocks noChangeAspect="1" noChangeArrowheads="1"/>
-          </p:cNvPicPr>
-          <p:nvPr/>
-        </p:nvPicPr>
-        <p:blipFill rotWithShape="1">
-          <a:blip r:embed="rId5">
-            <a:extLst>
-              <a:ext uri="{28A0092B-C50C-407E-A947-70E740481C1C}">
-                <a14:useLocalDpi xmlns:a14="http://schemas.microsoft.com/office/drawing/2010/main" val="0"/>
-              </a:ext>
-            </a:extLst>
-          </a:blip>
-          <a:srcRect l="12015" t="21157" r="12241" b="21452"/>
-          <a:stretch/>
-        </p:blipFill>
-        <p:spPr bwMode="auto">
-          <a:xfrm>
-            <a:off x="12825093" y="16831829"/>
-            <a:ext cx="5987011" cy="4536413"/>
-          </a:xfrm>
-          <a:prstGeom prst="rect">
-            <a:avLst/>
-          </a:prstGeom>
-          <a:noFill/>
-          <a:effectLst/>
-          <a:extLst>
-            <a:ext uri="{909E8E84-426E-40DD-AFC4-6F175D3DCCD1}">
-              <a14:hiddenFill xmlns:a14="http://schemas.microsoft.com/office/drawing/2010/main">
-                <a:solidFill>
-                  <a:srgbClr val="FFFFFF"/>
-                </a:solidFill>
-              </a14:hiddenFill>
-            </a:ext>
-          </a:extLst>
-        </p:spPr>
-      </p:pic>
-      <p:sp>
-        <p:nvSpPr>
-          <p:cNvPr id="22" name="TextBox 21">
-            <a:extLst>
-              <a:ext uri="{FF2B5EF4-FFF2-40B4-BE49-F238E27FC236}">
-                <a16:creationId xmlns:a16="http://schemas.microsoft.com/office/drawing/2014/main" id="{2609F6B6-7BCB-350C-0B81-7EAFAF6EE15C}"/>
-              </a:ext>
-            </a:extLst>
-          </p:cNvPr>
-          <p:cNvSpPr txBox="1"/>
-          <p:nvPr/>
-        </p:nvSpPr>
-        <p:spPr>
-          <a:xfrm>
-            <a:off x="12793752" y="21735449"/>
-            <a:ext cx="12042532" cy="1938992"/>
-          </a:xfrm>
-          <a:prstGeom prst="rect">
-            <a:avLst/>
-          </a:prstGeom>
-          <a:noFill/>
-        </p:spPr>
-        <p:txBody>
-          <a:bodyPr wrap="square" rtlCol="0">
-            <a:spAutoFit/>
-          </a:bodyPr>
-          <a:lstStyle/>
-          <a:p>
-            <a:r>
-              <a:rPr lang="en-US" sz="4800" b="1" dirty="0">
-                <a:latin typeface="Arial" panose="020B0604020202020204" pitchFamily="34" charset="0"/>
-                <a:cs typeface="Arial" panose="020B0604020202020204" pitchFamily="34" charset="0"/>
-              </a:rPr>
-              <a:t>Isaac Sim</a:t>
-            </a:r>
-          </a:p>
-          <a:p>
-            <a:r>
-              <a:rPr lang="en-US" sz="3600" dirty="0">
-                <a:latin typeface="Arial" panose="020B0604020202020204" pitchFamily="34" charset="0"/>
-                <a:cs typeface="Arial" panose="020B0604020202020204" pitchFamily="34" charset="0"/>
-              </a:rPr>
-              <a:t>Developer simulation platform, allowing the robot to simulate the environment and act upon it in the real world. </a:t>
-            </a:r>
-          </a:p>
-        </p:txBody>
-      </p:sp>
-      <p:sp>
-        <p:nvSpPr>
-          <p:cNvPr id="26" name="Arrow: Down 25">
-            <a:extLst>
-              <a:ext uri="{FF2B5EF4-FFF2-40B4-BE49-F238E27FC236}">
-                <a16:creationId xmlns:a16="http://schemas.microsoft.com/office/drawing/2014/main" id="{F7836AF0-D323-A5E6-9977-A3264BB4EB45}"/>
-              </a:ext>
-            </a:extLst>
-          </p:cNvPr>
-          <p:cNvSpPr/>
-          <p:nvPr/>
-        </p:nvSpPr>
-        <p:spPr>
-          <a:xfrm>
-            <a:off x="14339734" y="12237708"/>
-            <a:ext cx="2064774" cy="4221491"/>
-          </a:xfrm>
-          <a:prstGeom prst="downArrow">
-            <a:avLst/>
-          </a:prstGeom>
-          <a:solidFill>
-            <a:schemeClr val="bg1"/>
-          </a:solidFill>
-          <a:ln>
-            <a:noFill/>
-          </a:ln>
-        </p:spPr>
-        <p:style>
-          <a:lnRef idx="2">
-            <a:schemeClr val="accent1">
-              <a:shade val="15000"/>
-            </a:schemeClr>
-          </a:lnRef>
-          <a:fillRef idx="1">
-            <a:schemeClr val="accent1"/>
-          </a:fillRef>
-          <a:effectRef idx="0">
-            <a:schemeClr val="accent1"/>
-          </a:effectRef>
-          <a:fontRef idx="minor">
-            <a:schemeClr val="lt1"/>
-          </a:fontRef>
-        </p:style>
-        <p:txBody>
-          <a:bodyPr rtlCol="0" anchor="ctr"/>
-          <a:lstStyle/>
-          <a:p>
-            <a:pPr algn="ctr"/>
-            <a:endParaRPr lang="en-US" dirty="0"/>
-          </a:p>
-        </p:txBody>
-      </p:sp>
-      <p:sp>
-        <p:nvSpPr>
-          <p:cNvPr id="27" name="Arrow: Right 26">
-            <a:extLst>
-              <a:ext uri="{FF2B5EF4-FFF2-40B4-BE49-F238E27FC236}">
-                <a16:creationId xmlns:a16="http://schemas.microsoft.com/office/drawing/2014/main" id="{D9AFB0C7-CBB5-3E96-11C1-488B0F633053}"/>
-              </a:ext>
-            </a:extLst>
-          </p:cNvPr>
-          <p:cNvSpPr/>
-          <p:nvPr/>
-        </p:nvSpPr>
-        <p:spPr>
-          <a:xfrm>
-            <a:off x="18464981" y="17516520"/>
-            <a:ext cx="6614117" cy="1938992"/>
-          </a:xfrm>
-          <a:prstGeom prst="rightArrow">
-            <a:avLst/>
-          </a:prstGeom>
-          <a:solidFill>
-            <a:schemeClr val="bg1"/>
-          </a:solidFill>
-          <a:ln>
-            <a:noFill/>
-          </a:ln>
-        </p:spPr>
-        <p:style>
-          <a:lnRef idx="2">
-            <a:schemeClr val="accent1">
-              <a:shade val="15000"/>
-            </a:schemeClr>
-          </a:lnRef>
-          <a:fillRef idx="1">
-            <a:schemeClr val="accent1"/>
-          </a:fillRef>
-          <a:effectRef idx="0">
-            <a:schemeClr val="accent1"/>
-          </a:effectRef>
-          <a:fontRef idx="minor">
-            <a:schemeClr val="lt1"/>
-          </a:fontRef>
-        </p:style>
-        <p:txBody>
-          <a:bodyPr rtlCol="0" anchor="ctr"/>
-          <a:lstStyle/>
-          <a:p>
-            <a:pPr algn="ctr"/>
-            <a:endParaRPr lang="en-US" dirty="0"/>
-          </a:p>
-        </p:txBody>
-      </p:sp>
       <p:sp>
         <p:nvSpPr>
           <p:cNvPr id="28" name="Rectangle: Rounded Corners 27">
@@ -4783,8 +4600,8 @@
         </p:nvSpPr>
         <p:spPr>
           <a:xfrm>
-            <a:off x="12344397" y="24820496"/>
-            <a:ext cx="30937203" cy="3079980"/>
+            <a:off x="12344397" y="23103560"/>
+            <a:ext cx="30937203" cy="4796916"/>
           </a:xfrm>
           <a:prstGeom prst="roundRect">
             <a:avLst>
@@ -4886,6 +4703,28 @@
               </a:rPr>
               <a:t>[2] NVIDIA Isaac Sim Development Guide (2024)</a:t>
             </a:r>
+          </a:p>
+          <a:p>
+            <a:pPr>
+              <a:lnSpc>
+                <a:spcPct val="115000"/>
+              </a:lnSpc>
+              <a:spcAft>
+                <a:spcPts val="800"/>
+              </a:spcAft>
+            </a:pPr>
+            <a:r>
+              <a:rPr lang="en-US" sz="3600" kern="0" dirty="0">
+                <a:solidFill>
+                  <a:schemeClr val="tx1"/>
+                </a:solidFill>
+                <a:effectLst/>
+                <a:latin typeface="Arial" panose="020B0604020202020204" pitchFamily="34" charset="0"/>
+                <a:ea typeface="Times New Roman" panose="02020603050405020304" pitchFamily="18" charset="0"/>
+                <a:cs typeface="Arial" panose="020B0604020202020204" pitchFamily="34" charset="0"/>
+              </a:rPr>
+              <a:t>[3] Previous VCU Capstone Projects (2022-2023) - Phases 1 &amp; 2</a:t>
+            </a:r>
             <a:endParaRPr lang="en-US" sz="3600" kern="100" dirty="0">
               <a:solidFill>
                 <a:schemeClr val="tx1"/>
@@ -4926,12 +4765,208 @@
           </a:p>
         </p:txBody>
       </p:sp>
-      <p:sp>
-        <p:nvSpPr>
-          <p:cNvPr id="2" name="TextBox 1">
+      <p:pic>
+        <p:nvPicPr>
+          <p:cNvPr id="6" name="Picture 6" descr="The Comprehensive Guide to Robots (Cobots) on RS Marketplace">
             <a:extLst>
               <a:ext uri="{FF2B5EF4-FFF2-40B4-BE49-F238E27FC236}">
-                <a16:creationId xmlns:a16="http://schemas.microsoft.com/office/drawing/2014/main" id="{E126598F-4B77-A78B-16C1-DCB265545665}"/>
+                <a16:creationId xmlns:a16="http://schemas.microsoft.com/office/drawing/2014/main" id="{281AB8A6-DA3D-7057-FCA0-6B09FD6CD19D}"/>
+              </a:ext>
+            </a:extLst>
+          </p:cNvPr>
+          <p:cNvPicPr>
+            <a:picLocks noChangeAspect="1" noChangeArrowheads="1"/>
+          </p:cNvPicPr>
+          <p:nvPr/>
+        </p:nvPicPr>
+        <p:blipFill rotWithShape="1">
+          <a:blip r:embed="rId4">
+            <a:extLst>
+              <a:ext uri="{28A0092B-C50C-407E-A947-70E740481C1C}">
+                <a14:useLocalDpi xmlns:a14="http://schemas.microsoft.com/office/drawing/2010/main" val="0"/>
+              </a:ext>
+            </a:extLst>
+          </a:blip>
+          <a:srcRect l="15110" t="19505" r="26643" b="7768"/>
+          <a:stretch/>
+        </p:blipFill>
+        <p:spPr bwMode="auto">
+          <a:xfrm>
+            <a:off x="24098534" y="7808299"/>
+            <a:ext cx="6372320" cy="8378655"/>
+          </a:xfrm>
+          <a:prstGeom prst="rect">
+            <a:avLst/>
+          </a:prstGeom>
+          <a:noFill/>
+          <a:extLst>
+            <a:ext uri="{909E8E84-426E-40DD-AFC4-6F175D3DCCD1}">
+              <a14:hiddenFill xmlns:a14="http://schemas.microsoft.com/office/drawing/2010/main">
+                <a:solidFill>
+                  <a:srgbClr val="FFFFFF"/>
+                </a:solidFill>
+              </a14:hiddenFill>
+            </a:ext>
+          </a:extLst>
+        </p:spPr>
+      </p:pic>
+      <p:sp>
+        <p:nvSpPr>
+          <p:cNvPr id="15" name="Rectangle: Rounded Corners 14">
+            <a:extLst>
+              <a:ext uri="{FF2B5EF4-FFF2-40B4-BE49-F238E27FC236}">
+                <a16:creationId xmlns:a16="http://schemas.microsoft.com/office/drawing/2014/main" id="{B02E8EEB-6D78-B60E-C371-EA4F01AD3EE0}"/>
+              </a:ext>
+            </a:extLst>
+          </p:cNvPr>
+          <p:cNvSpPr/>
+          <p:nvPr/>
+        </p:nvSpPr>
+        <p:spPr>
+          <a:xfrm>
+            <a:off x="20869654" y="16037899"/>
+            <a:ext cx="10972800" cy="5486400"/>
+          </a:xfrm>
+          <a:prstGeom prst="roundRect">
+            <a:avLst>
+              <a:gd name="adj" fmla="val 4663"/>
+            </a:avLst>
+          </a:prstGeom>
+          <a:solidFill>
+            <a:schemeClr val="bg1"/>
+          </a:solidFill>
+        </p:spPr>
+        <p:style>
+          <a:lnRef idx="2">
+            <a:schemeClr val="accent1">
+              <a:shade val="15000"/>
+            </a:schemeClr>
+          </a:lnRef>
+          <a:fillRef idx="1">
+            <a:schemeClr val="accent1"/>
+          </a:fillRef>
+          <a:effectRef idx="0">
+            <a:schemeClr val="accent1"/>
+          </a:effectRef>
+          <a:fontRef idx="minor">
+            <a:schemeClr val="lt1"/>
+          </a:fontRef>
+        </p:style>
+        <p:txBody>
+          <a:bodyPr lIns="457200" tIns="457200" rIns="457200" bIns="457200" rtlCol="0" anchor="t" anchorCtr="0"/>
+          <a:lstStyle/>
+          <a:p>
+            <a:pPr algn="ctr"/>
+            <a:r>
+              <a:rPr lang="en-US" sz="4800" b="1" dirty="0">
+                <a:solidFill>
+                  <a:schemeClr val="tx1"/>
+                </a:solidFill>
+                <a:latin typeface="Arial" panose="020B0604020202020204" pitchFamily="34" charset="0"/>
+                <a:cs typeface="Arial" panose="020B0604020202020204" pitchFamily="34" charset="0"/>
+              </a:rPr>
+              <a:t>Processing &amp; Simulation</a:t>
+            </a:r>
+          </a:p>
+        </p:txBody>
+      </p:sp>
+      <p:pic>
+        <p:nvPicPr>
+          <p:cNvPr id="3" name="Picture 2" descr="OpenCV: Que es OpenCV">
+            <a:extLst>
+              <a:ext uri="{FF2B5EF4-FFF2-40B4-BE49-F238E27FC236}">
+                <a16:creationId xmlns:a16="http://schemas.microsoft.com/office/drawing/2014/main" id="{B4581CC9-ECF6-DBBA-7F79-DC9CDE7F5BD0}"/>
+              </a:ext>
+            </a:extLst>
+          </p:cNvPr>
+          <p:cNvPicPr>
+            <a:picLocks noChangeAspect="1" noChangeArrowheads="1"/>
+          </p:cNvPicPr>
+          <p:nvPr/>
+        </p:nvPicPr>
+        <p:blipFill rotWithShape="1">
+          <a:blip r:embed="rId5">
+            <a:extLst>
+              <a:ext uri="{28A0092B-C50C-407E-A947-70E740481C1C}">
+                <a14:useLocalDpi xmlns:a14="http://schemas.microsoft.com/office/drawing/2010/main" val="0"/>
+              </a:ext>
+            </a:extLst>
+          </a:blip>
+          <a:srcRect b="24392"/>
+          <a:stretch/>
+        </p:blipFill>
+        <p:spPr bwMode="auto">
+          <a:xfrm>
+            <a:off x="22318050" y="17930465"/>
+            <a:ext cx="1962246" cy="1828800"/>
+          </a:xfrm>
+          <a:prstGeom prst="rect">
+            <a:avLst/>
+          </a:prstGeom>
+          <a:noFill/>
+          <a:extLst>
+            <a:ext uri="{909E8E84-426E-40DD-AFC4-6F175D3DCCD1}">
+              <a14:hiddenFill xmlns:a14="http://schemas.microsoft.com/office/drawing/2010/main">
+                <a:solidFill>
+                  <a:srgbClr val="FFFFFF"/>
+                </a:solidFill>
+              </a14:hiddenFill>
+            </a:ext>
+          </a:extLst>
+        </p:spPr>
+      </p:pic>
+      <p:pic>
+        <p:nvPicPr>
+          <p:cNvPr id="1034" name="Picture 10" descr="Nvidia Logo - PNG y Vector">
+            <a:extLst>
+              <a:ext uri="{FF2B5EF4-FFF2-40B4-BE49-F238E27FC236}">
+                <a16:creationId xmlns:a16="http://schemas.microsoft.com/office/drawing/2014/main" id="{83B7F37D-931E-DF97-C9E8-FFA8D855175B}"/>
+              </a:ext>
+            </a:extLst>
+          </p:cNvPr>
+          <p:cNvPicPr>
+            <a:picLocks noChangeAspect="1" noChangeArrowheads="1"/>
+          </p:cNvPicPr>
+          <p:nvPr/>
+        </p:nvPicPr>
+        <p:blipFill rotWithShape="1">
+          <a:blip r:embed="rId6">
+            <a:extLst>
+              <a:ext uri="{28A0092B-C50C-407E-A947-70E740481C1C}">
+                <a14:useLocalDpi xmlns:a14="http://schemas.microsoft.com/office/drawing/2010/main" val="0"/>
+              </a:ext>
+            </a:extLst>
+          </a:blip>
+          <a:srcRect l="17037" t="21156" r="28573" b="41190"/>
+          <a:stretch/>
+        </p:blipFill>
+        <p:spPr bwMode="auto">
+          <a:xfrm>
+            <a:off x="27508262" y="17930465"/>
+            <a:ext cx="2641717" cy="1828800"/>
+          </a:xfrm>
+          <a:prstGeom prst="rect">
+            <a:avLst/>
+          </a:prstGeom>
+          <a:noFill/>
+          <a:effectLst/>
+          <a:extLst>
+            <a:ext uri="{909E8E84-426E-40DD-AFC4-6F175D3DCCD1}">
+              <a14:hiddenFill xmlns:a14="http://schemas.microsoft.com/office/drawing/2010/main">
+                <a:solidFill>
+                  <a:srgbClr val="FFFFFF"/>
+                </a:solidFill>
+              </a14:hiddenFill>
+            </a:ext>
+          </a:extLst>
+        </p:spPr>
+      </p:pic>
+      <p:sp>
+        <p:nvSpPr>
+          <p:cNvPr id="22" name="TextBox 21">
+            <a:extLst>
+              <a:ext uri="{FF2B5EF4-FFF2-40B4-BE49-F238E27FC236}">
+                <a16:creationId xmlns:a16="http://schemas.microsoft.com/office/drawing/2014/main" id="{2609F6B6-7BCB-350C-0B81-7EAFAF6EE15C}"/>
               </a:ext>
             </a:extLst>
           </p:cNvPr>
@@ -4940,8 +4975,8 @@
         </p:nvSpPr>
         <p:spPr>
           <a:xfrm>
-            <a:off x="26384410" y="26037320"/>
-            <a:ext cx="15329647" cy="646331"/>
+            <a:off x="26221301" y="19759265"/>
+            <a:ext cx="5215640" cy="1384995"/>
           </a:xfrm>
           <a:prstGeom prst="rect">
             <a:avLst/>
@@ -4954,27 +4989,653 @@
           </a:bodyPr>
           <a:lstStyle/>
           <a:p>
-            <a:r>
-              <a:rPr lang="en-US" sz="3600" kern="0" dirty="0">
+            <a:pPr algn="ctr"/>
+            <a:r>
+              <a:rPr lang="en-US" sz="4800" b="1" dirty="0">
                 <a:latin typeface="Arial" panose="020B0604020202020204" pitchFamily="34" charset="0"/>
-                <a:ea typeface="Times New Roman" panose="02020603050405020304" pitchFamily="18" charset="0"/>
                 <a:cs typeface="Arial" panose="020B0604020202020204" pitchFamily="34" charset="0"/>
               </a:rPr>
-              <a:t>[3</a:t>
-            </a:r>
-            <a:r>
-              <a:rPr lang="en-US" sz="3600" kern="0" dirty="0">
-                <a:solidFill>
-                  <a:schemeClr val="tx1"/>
-                </a:solidFill>
-                <a:effectLst/>
+              <a:t>Isaac Sim</a:t>
+            </a:r>
+          </a:p>
+          <a:p>
+            <a:pPr algn="ctr"/>
+            <a:r>
+              <a:rPr lang="en-US" sz="3600" dirty="0">
                 <a:latin typeface="Arial" panose="020B0604020202020204" pitchFamily="34" charset="0"/>
-                <a:ea typeface="Times New Roman" panose="02020603050405020304" pitchFamily="18" charset="0"/>
                 <a:cs typeface="Arial" panose="020B0604020202020204" pitchFamily="34" charset="0"/>
               </a:rPr>
-              <a:t>] Previous VCU Capstone Projects (2022-2023) - Phases 1 &amp; 2</a:t>
-            </a:r>
-            <a:endParaRPr lang="en-US" sz="3600" dirty="0"/>
+              <a:t>Environment Simulation </a:t>
+            </a:r>
+          </a:p>
+        </p:txBody>
+      </p:sp>
+      <p:sp>
+        <p:nvSpPr>
+          <p:cNvPr id="17" name="TextBox 16">
+            <a:extLst>
+              <a:ext uri="{FF2B5EF4-FFF2-40B4-BE49-F238E27FC236}">
+                <a16:creationId xmlns:a16="http://schemas.microsoft.com/office/drawing/2014/main" id="{7AF09225-D0F8-3619-4957-A4D1088566D1}"/>
+              </a:ext>
+            </a:extLst>
+          </p:cNvPr>
+          <p:cNvSpPr txBox="1"/>
+          <p:nvPr/>
+        </p:nvSpPr>
+        <p:spPr>
+          <a:xfrm>
+            <a:off x="21393715" y="19759265"/>
+            <a:ext cx="3810916" cy="1384995"/>
+          </a:xfrm>
+          <a:prstGeom prst="rect">
+            <a:avLst/>
+          </a:prstGeom>
+          <a:noFill/>
+        </p:spPr>
+        <p:txBody>
+          <a:bodyPr wrap="square" rtlCol="0">
+            <a:spAutoFit/>
+          </a:bodyPr>
+          <a:lstStyle/>
+          <a:p>
+            <a:pPr algn="ctr"/>
+            <a:r>
+              <a:rPr lang="en-US" sz="4800" b="1" dirty="0">
+                <a:latin typeface="Arial" panose="020B0604020202020204" pitchFamily="34" charset="0"/>
+                <a:cs typeface="Arial" panose="020B0604020202020204" pitchFamily="34" charset="0"/>
+              </a:rPr>
+              <a:t>OpenCV</a:t>
+            </a:r>
+          </a:p>
+          <a:p>
+            <a:pPr algn="ctr"/>
+            <a:r>
+              <a:rPr lang="en-US" sz="3600" dirty="0">
+                <a:latin typeface="Arial" panose="020B0604020202020204" pitchFamily="34" charset="0"/>
+                <a:cs typeface="Arial" panose="020B0604020202020204" pitchFamily="34" charset="0"/>
+              </a:rPr>
+              <a:t>Vision Processing</a:t>
+            </a:r>
+          </a:p>
+        </p:txBody>
+      </p:sp>
+      <p:sp>
+        <p:nvSpPr>
+          <p:cNvPr id="20" name="Arrow: Right 19">
+            <a:extLst>
+              <a:ext uri="{FF2B5EF4-FFF2-40B4-BE49-F238E27FC236}">
+                <a16:creationId xmlns:a16="http://schemas.microsoft.com/office/drawing/2014/main" id="{6FE7D63A-A1D7-B144-994C-360449F3B89E}"/>
+              </a:ext>
+            </a:extLst>
+          </p:cNvPr>
+          <p:cNvSpPr/>
+          <p:nvPr/>
+        </p:nvSpPr>
+        <p:spPr>
+          <a:xfrm>
+            <a:off x="24751279" y="18501965"/>
+            <a:ext cx="2286000" cy="914400"/>
+          </a:xfrm>
+          <a:prstGeom prst="rightArrow">
+            <a:avLst/>
+          </a:prstGeom>
+          <a:solidFill>
+            <a:schemeClr val="bg1"/>
+          </a:solidFill>
+        </p:spPr>
+        <p:style>
+          <a:lnRef idx="2">
+            <a:schemeClr val="accent1">
+              <a:shade val="15000"/>
+            </a:schemeClr>
+          </a:lnRef>
+          <a:fillRef idx="1">
+            <a:schemeClr val="accent1"/>
+          </a:fillRef>
+          <a:effectRef idx="0">
+            <a:schemeClr val="accent1"/>
+          </a:effectRef>
+          <a:fontRef idx="minor">
+            <a:schemeClr val="lt1"/>
+          </a:fontRef>
+        </p:style>
+        <p:txBody>
+          <a:bodyPr rtlCol="0" anchor="ctr"/>
+          <a:lstStyle/>
+          <a:p>
+            <a:pPr algn="ctr"/>
+            <a:endParaRPr lang="en-US" dirty="0"/>
+          </a:p>
+        </p:txBody>
+      </p:sp>
+      <p:pic>
+        <p:nvPicPr>
+          <p:cNvPr id="32" name="Picture 8" descr="Free Person Icon, Download Free Person Icon png images, Free ClipArts ...">
+            <a:extLst>
+              <a:ext uri="{FF2B5EF4-FFF2-40B4-BE49-F238E27FC236}">
+                <a16:creationId xmlns:a16="http://schemas.microsoft.com/office/drawing/2014/main" id="{D244F16B-C5BB-9434-B38E-9BDF2F66CBE1}"/>
+              </a:ext>
+            </a:extLst>
+          </p:cNvPr>
+          <p:cNvPicPr>
+            <a:picLocks noChangeAspect="1" noChangeArrowheads="1"/>
+          </p:cNvPicPr>
+          <p:nvPr/>
+        </p:nvPicPr>
+        <p:blipFill rotWithShape="1">
+          <a:blip r:embed="rId7">
+            <a:extLst>
+              <a:ext uri="{28A0092B-C50C-407E-A947-70E740481C1C}">
+                <a14:useLocalDpi xmlns:a14="http://schemas.microsoft.com/office/drawing/2010/main" val="0"/>
+              </a:ext>
+            </a:extLst>
+          </a:blip>
+          <a:srcRect t="6051" b="5630"/>
+          <a:stretch/>
+        </p:blipFill>
+        <p:spPr bwMode="auto">
+          <a:xfrm>
+            <a:off x="14158645" y="9584034"/>
+            <a:ext cx="4862995" cy="4572000"/>
+          </a:xfrm>
+          <a:prstGeom prst="rect">
+            <a:avLst/>
+          </a:prstGeom>
+          <a:noFill/>
+          <a:extLst>
+            <a:ext uri="{909E8E84-426E-40DD-AFC4-6F175D3DCCD1}">
+              <a14:hiddenFill xmlns:a14="http://schemas.microsoft.com/office/drawing/2010/main">
+                <a:solidFill>
+                  <a:srgbClr val="FFFFFF"/>
+                </a:solidFill>
+              </a14:hiddenFill>
+            </a:ext>
+          </a:extLst>
+        </p:spPr>
+      </p:pic>
+      <p:sp>
+        <p:nvSpPr>
+          <p:cNvPr id="33" name="TextBox 32">
+            <a:extLst>
+              <a:ext uri="{FF2B5EF4-FFF2-40B4-BE49-F238E27FC236}">
+                <a16:creationId xmlns:a16="http://schemas.microsoft.com/office/drawing/2014/main" id="{2CDDCC92-BC00-8C29-D5D8-30CF0865A78B}"/>
+              </a:ext>
+            </a:extLst>
+          </p:cNvPr>
+          <p:cNvSpPr txBox="1"/>
+          <p:nvPr/>
+        </p:nvSpPr>
+        <p:spPr>
+          <a:xfrm>
+            <a:off x="14304142" y="14184476"/>
+            <a:ext cx="4572000" cy="1384995"/>
+          </a:xfrm>
+          <a:prstGeom prst="rect">
+            <a:avLst/>
+          </a:prstGeom>
+          <a:noFill/>
+        </p:spPr>
+        <p:txBody>
+          <a:bodyPr wrap="square" rtlCol="0">
+            <a:spAutoFit/>
+          </a:bodyPr>
+          <a:lstStyle/>
+          <a:p>
+            <a:pPr algn="ctr"/>
+            <a:r>
+              <a:rPr lang="en-US" sz="4800" b="1" dirty="0">
+                <a:latin typeface="Arial" panose="020B0604020202020204" pitchFamily="34" charset="0"/>
+                <a:cs typeface="Arial" panose="020B0604020202020204" pitchFamily="34" charset="0"/>
+              </a:rPr>
+              <a:t>Human Worker</a:t>
+            </a:r>
+          </a:p>
+          <a:p>
+            <a:pPr algn="ctr"/>
+            <a:r>
+              <a:rPr lang="en-US" sz="3600" dirty="0">
+                <a:latin typeface="Arial" panose="020B0604020202020204" pitchFamily="34" charset="0"/>
+                <a:cs typeface="Arial" panose="020B0604020202020204" pitchFamily="34" charset="0"/>
+              </a:rPr>
+              <a:t>Real-time Position</a:t>
+            </a:r>
+          </a:p>
+        </p:txBody>
+      </p:sp>
+      <p:sp>
+        <p:nvSpPr>
+          <p:cNvPr id="34" name="Arrow: Down 33">
+            <a:extLst>
+              <a:ext uri="{FF2B5EF4-FFF2-40B4-BE49-F238E27FC236}">
+                <a16:creationId xmlns:a16="http://schemas.microsoft.com/office/drawing/2014/main" id="{FD7E994B-D6E1-FC96-A24F-90CE66D48430}"/>
+              </a:ext>
+            </a:extLst>
+          </p:cNvPr>
+          <p:cNvSpPr/>
+          <p:nvPr/>
+        </p:nvSpPr>
+        <p:spPr>
+          <a:xfrm>
+            <a:off x="16138769" y="16143716"/>
+            <a:ext cx="914400" cy="1828800"/>
+          </a:xfrm>
+          <a:prstGeom prst="downArrow">
+            <a:avLst/>
+          </a:prstGeom>
+          <a:solidFill>
+            <a:schemeClr val="bg1"/>
+          </a:solidFill>
+        </p:spPr>
+        <p:style>
+          <a:lnRef idx="2">
+            <a:schemeClr val="accent1">
+              <a:shade val="15000"/>
+            </a:schemeClr>
+          </a:lnRef>
+          <a:fillRef idx="1">
+            <a:schemeClr val="accent1"/>
+          </a:fillRef>
+          <a:effectRef idx="0">
+            <a:schemeClr val="accent1"/>
+          </a:effectRef>
+          <a:fontRef idx="minor">
+            <a:schemeClr val="lt1"/>
+          </a:fontRef>
+        </p:style>
+        <p:txBody>
+          <a:bodyPr rtlCol="0" anchor="ctr"/>
+          <a:lstStyle/>
+          <a:p>
+            <a:pPr algn="ctr"/>
+            <a:endParaRPr lang="en-US" dirty="0"/>
+          </a:p>
+        </p:txBody>
+      </p:sp>
+      <p:sp>
+        <p:nvSpPr>
+          <p:cNvPr id="35" name="Arrow: Right 34">
+            <a:extLst>
+              <a:ext uri="{FF2B5EF4-FFF2-40B4-BE49-F238E27FC236}">
+                <a16:creationId xmlns:a16="http://schemas.microsoft.com/office/drawing/2014/main" id="{86DD50D8-94A5-BEE3-3B2A-2A9C8ACA989F}"/>
+              </a:ext>
+            </a:extLst>
+          </p:cNvPr>
+          <p:cNvSpPr/>
+          <p:nvPr/>
+        </p:nvSpPr>
+        <p:spPr>
+          <a:xfrm>
+            <a:off x="19451199" y="18501965"/>
+            <a:ext cx="2286000" cy="914400"/>
+          </a:xfrm>
+          <a:prstGeom prst="rightArrow">
+            <a:avLst/>
+          </a:prstGeom>
+          <a:solidFill>
+            <a:schemeClr val="bg1"/>
+          </a:solidFill>
+        </p:spPr>
+        <p:style>
+          <a:lnRef idx="2">
+            <a:schemeClr val="accent1">
+              <a:shade val="15000"/>
+            </a:schemeClr>
+          </a:lnRef>
+          <a:fillRef idx="1">
+            <a:schemeClr val="accent1"/>
+          </a:fillRef>
+          <a:effectRef idx="0">
+            <a:schemeClr val="accent1"/>
+          </a:effectRef>
+          <a:fontRef idx="minor">
+            <a:schemeClr val="lt1"/>
+          </a:fontRef>
+        </p:style>
+        <p:txBody>
+          <a:bodyPr rtlCol="0" anchor="ctr"/>
+          <a:lstStyle/>
+          <a:p>
+            <a:pPr algn="ctr"/>
+            <a:endParaRPr lang="en-US" dirty="0"/>
+          </a:p>
+        </p:txBody>
+      </p:sp>
+      <p:sp>
+        <p:nvSpPr>
+          <p:cNvPr id="36" name="Arrow: Curved Left 35">
+            <a:extLst>
+              <a:ext uri="{FF2B5EF4-FFF2-40B4-BE49-F238E27FC236}">
+                <a16:creationId xmlns:a16="http://schemas.microsoft.com/office/drawing/2014/main" id="{3669FEC4-9CB4-F456-CFD6-BF9038741D94}"/>
+              </a:ext>
+            </a:extLst>
+          </p:cNvPr>
+          <p:cNvSpPr/>
+          <p:nvPr/>
+        </p:nvSpPr>
+        <p:spPr>
+          <a:xfrm flipV="1">
+            <a:off x="30620962" y="11068781"/>
+            <a:ext cx="1371600" cy="8001000"/>
+          </a:xfrm>
+          <a:prstGeom prst="curvedLeftArrow">
+            <a:avLst/>
+          </a:prstGeom>
+          <a:solidFill>
+            <a:schemeClr val="bg1"/>
+          </a:solidFill>
+          <a:ln>
+            <a:solidFill>
+              <a:schemeClr val="accent1">
+                <a:shade val="15000"/>
+              </a:schemeClr>
+            </a:solidFill>
+            <a:headEnd type="none"/>
+            <a:extLst>
+              <a:ext uri="{C807C97D-BFC1-408E-A445-0C87EB9F89A2}">
+                <ask:lineSketchStyleProps xmlns:ask="http://schemas.microsoft.com/office/drawing/2018/sketchyshapes" sd="1219033472">
+                  <a:custGeom>
+                    <a:avLst/>
+                    <a:gdLst>
+                      <a:gd name="connsiteX0" fmla="*/ 0 w 1371600"/>
+                      <a:gd name="connsiteY0" fmla="*/ 7586210 h 7929110"/>
+                      <a:gd name="connsiteX1" fmla="*/ 342900 w 1371600"/>
+                      <a:gd name="connsiteY1" fmla="*/ 7125585 h 7929110"/>
+                      <a:gd name="connsiteX2" fmla="*/ 342900 w 1371600"/>
+                      <a:gd name="connsiteY2" fmla="*/ 7297035 h 7929110"/>
+                      <a:gd name="connsiteX3" fmla="*/ 1370132 w 1371600"/>
+                      <a:gd name="connsiteY3" fmla="*/ 3878830 h 7929110"/>
+                      <a:gd name="connsiteX4" fmla="*/ 1315030 w 1371600"/>
+                      <a:gd name="connsiteY4" fmla="*/ 5104023 h 7929110"/>
+                      <a:gd name="connsiteX5" fmla="*/ 342898 w 1371600"/>
+                      <a:gd name="connsiteY5" fmla="*/ 7639936 h 7929110"/>
+                      <a:gd name="connsiteX6" fmla="*/ 342900 w 1371600"/>
+                      <a:gd name="connsiteY6" fmla="*/ 7811385 h 7929110"/>
+                      <a:gd name="connsiteX7" fmla="*/ 0 w 1371600"/>
+                      <a:gd name="connsiteY7" fmla="*/ 7586210 h 7929110"/>
+                      <a:gd name="connsiteX0" fmla="*/ 1371600 w 1371600"/>
+                      <a:gd name="connsiteY0" fmla="*/ 4050280 h 7929110"/>
+                      <a:gd name="connsiteX1" fmla="*/ 0 w 1371600"/>
+                      <a:gd name="connsiteY1" fmla="*/ 342900 h 7929110"/>
+                      <a:gd name="connsiteX2" fmla="*/ 0 w 1371600"/>
+                      <a:gd name="connsiteY2" fmla="*/ 0 h 7929110"/>
+                      <a:gd name="connsiteX3" fmla="*/ 1371600 w 1371600"/>
+                      <a:gd name="connsiteY3" fmla="*/ 3707380 h 7929110"/>
+                      <a:gd name="connsiteX4" fmla="*/ 1371600 w 1371600"/>
+                      <a:gd name="connsiteY4" fmla="*/ 4050280 h 7929110"/>
+                      <a:gd name="connsiteX0" fmla="*/ 1371600 w 1371600"/>
+                      <a:gd name="connsiteY0" fmla="*/ 4050280 h 7929110"/>
+                      <a:gd name="connsiteX1" fmla="*/ 0 w 1371600"/>
+                      <a:gd name="connsiteY1" fmla="*/ 342900 h 7929110"/>
+                      <a:gd name="connsiteX2" fmla="*/ 0 w 1371600"/>
+                      <a:gd name="connsiteY2" fmla="*/ 0 h 7929110"/>
+                      <a:gd name="connsiteX3" fmla="*/ 1371600 w 1371600"/>
+                      <a:gd name="connsiteY3" fmla="*/ 3707380 h 7929110"/>
+                      <a:gd name="connsiteX4" fmla="*/ 1371600 w 1371600"/>
+                      <a:gd name="connsiteY4" fmla="*/ 4050280 h 7929110"/>
+                      <a:gd name="connsiteX5" fmla="*/ 342900 w 1371600"/>
+                      <a:gd name="connsiteY5" fmla="*/ 7639935 h 7929110"/>
+                      <a:gd name="connsiteX6" fmla="*/ 342900 w 1371600"/>
+                      <a:gd name="connsiteY6" fmla="*/ 7811385 h 7929110"/>
+                      <a:gd name="connsiteX7" fmla="*/ 0 w 1371600"/>
+                      <a:gd name="connsiteY7" fmla="*/ 7586210 h 7929110"/>
+                      <a:gd name="connsiteX8" fmla="*/ 342900 w 1371600"/>
+                      <a:gd name="connsiteY8" fmla="*/ 7125585 h 7929110"/>
+                      <a:gd name="connsiteX9" fmla="*/ 342900 w 1371600"/>
+                      <a:gd name="connsiteY9" fmla="*/ 7297035 h 7929110"/>
+                      <a:gd name="connsiteX10" fmla="*/ 1370132 w 1371600"/>
+                      <a:gd name="connsiteY10" fmla="*/ 3878830 h 7929110"/>
+                    </a:gdLst>
+                    <a:ahLst/>
+                    <a:cxnLst>
+                      <a:cxn ang="0">
+                        <a:pos x="connsiteX0" y="connsiteY0"/>
+                      </a:cxn>
+                      <a:cxn ang="0">
+                        <a:pos x="connsiteX1" y="connsiteY1"/>
+                      </a:cxn>
+                      <a:cxn ang="0">
+                        <a:pos x="connsiteX2" y="connsiteY2"/>
+                      </a:cxn>
+                      <a:cxn ang="0">
+                        <a:pos x="connsiteX3" y="connsiteY3"/>
+                      </a:cxn>
+                      <a:cxn ang="0">
+                        <a:pos x="connsiteX4" y="connsiteY4"/>
+                      </a:cxn>
+                      <a:cxn ang="0">
+                        <a:pos x="connsiteX5" y="connsiteY5"/>
+                      </a:cxn>
+                      <a:cxn ang="0">
+                        <a:pos x="connsiteX6" y="connsiteY6"/>
+                      </a:cxn>
+                      <a:cxn ang="0">
+                        <a:pos x="connsiteX7" y="connsiteY7"/>
+                      </a:cxn>
+                      <a:cxn ang="0">
+                        <a:pos x="connsiteX8" y="connsiteY8"/>
+                      </a:cxn>
+                      <a:cxn ang="0">
+                        <a:pos x="connsiteX9" y="connsiteY9"/>
+                      </a:cxn>
+                      <a:cxn ang="0">
+                        <a:pos x="connsiteX10" y="connsiteY10"/>
+                      </a:cxn>
+                    </a:cxnLst>
+                    <a:rect l="l" t="t" r="r" b="b"/>
+                    <a:pathLst>
+                      <a:path w="1371600" h="7929110" stroke="0" extrusionOk="0">
+                        <a:moveTo>
+                          <a:pt x="0" y="7586210"/>
+                        </a:moveTo>
+                        <a:cubicBezTo>
+                          <a:pt x="79108" y="7466188"/>
+                          <a:pt x="237338" y="7317141"/>
+                          <a:pt x="342900" y="7125585"/>
+                        </a:cubicBezTo>
+                        <a:cubicBezTo>
+                          <a:pt x="327902" y="7175471"/>
+                          <a:pt x="350208" y="7262421"/>
+                          <a:pt x="342900" y="7297035"/>
+                        </a:cubicBezTo>
+                        <a:cubicBezTo>
+                          <a:pt x="722105" y="7089120"/>
+                          <a:pt x="1317525" y="5640957"/>
+                          <a:pt x="1370132" y="3878830"/>
+                        </a:cubicBezTo>
+                        <a:cubicBezTo>
+                          <a:pt x="1311697" y="4256832"/>
+                          <a:pt x="1423298" y="4737732"/>
+                          <a:pt x="1315030" y="5104023"/>
+                        </a:cubicBezTo>
+                        <a:cubicBezTo>
+                          <a:pt x="1195598" y="6354063"/>
+                          <a:pt x="814966" y="7302602"/>
+                          <a:pt x="342898" y="7639936"/>
+                        </a:cubicBezTo>
+                        <a:cubicBezTo>
+                          <a:pt x="338325" y="7696386"/>
+                          <a:pt x="340277" y="7756704"/>
+                          <a:pt x="342900" y="7811385"/>
+                        </a:cubicBezTo>
+                        <a:cubicBezTo>
+                          <a:pt x="293685" y="7748274"/>
+                          <a:pt x="36902" y="7649104"/>
+                          <a:pt x="0" y="7586210"/>
+                        </a:cubicBezTo>
+                        <a:close/>
+                      </a:path>
+                      <a:path w="1371600" h="7929110" fill="darkenLess" stroke="0" extrusionOk="0">
+                        <a:moveTo>
+                          <a:pt x="1371600" y="4050280"/>
+                        </a:moveTo>
+                        <a:cubicBezTo>
+                          <a:pt x="1401654" y="2019577"/>
+                          <a:pt x="812069" y="356017"/>
+                          <a:pt x="0" y="342900"/>
+                        </a:cubicBezTo>
+                        <a:cubicBezTo>
+                          <a:pt x="22800" y="204180"/>
+                          <a:pt x="10853" y="101574"/>
+                          <a:pt x="0" y="0"/>
+                        </a:cubicBezTo>
+                        <a:cubicBezTo>
+                          <a:pt x="936339" y="266199"/>
+                          <a:pt x="1385907" y="1808026"/>
+                          <a:pt x="1371600" y="3707380"/>
+                        </a:cubicBezTo>
+                        <a:cubicBezTo>
+                          <a:pt x="1360013" y="3797550"/>
+                          <a:pt x="1350426" y="3996213"/>
+                          <a:pt x="1371600" y="4050280"/>
+                        </a:cubicBezTo>
+                        <a:close/>
+                      </a:path>
+                      <a:path w="1371600" h="7929110" fill="none" extrusionOk="0">
+                        <a:moveTo>
+                          <a:pt x="1371600" y="4050280"/>
+                        </a:moveTo>
+                        <a:cubicBezTo>
+                          <a:pt x="1342141" y="2061890"/>
+                          <a:pt x="685684" y="247594"/>
+                          <a:pt x="0" y="342900"/>
+                        </a:cubicBezTo>
+                        <a:cubicBezTo>
+                          <a:pt x="-11132" y="210273"/>
+                          <a:pt x="-11493" y="146976"/>
+                          <a:pt x="0" y="0"/>
+                        </a:cubicBezTo>
+                        <a:cubicBezTo>
+                          <a:pt x="1010931" y="159652"/>
+                          <a:pt x="1338723" y="1667066"/>
+                          <a:pt x="1371600" y="3707380"/>
+                        </a:cubicBezTo>
+                        <a:cubicBezTo>
+                          <a:pt x="1385776" y="3871547"/>
+                          <a:pt x="1341387" y="3898215"/>
+                          <a:pt x="1371600" y="4050280"/>
+                        </a:cubicBezTo>
+                        <a:cubicBezTo>
+                          <a:pt x="1473161" y="5664553"/>
+                          <a:pt x="958654" y="7199644"/>
+                          <a:pt x="342900" y="7639935"/>
+                        </a:cubicBezTo>
+                        <a:cubicBezTo>
+                          <a:pt x="338968" y="7720091"/>
+                          <a:pt x="350605" y="7729929"/>
+                          <a:pt x="342900" y="7811385"/>
+                        </a:cubicBezTo>
+                        <a:cubicBezTo>
+                          <a:pt x="224655" y="7709912"/>
+                          <a:pt x="99877" y="7694450"/>
+                          <a:pt x="0" y="7586210"/>
+                        </a:cubicBezTo>
+                        <a:cubicBezTo>
+                          <a:pt x="162926" y="7421621"/>
+                          <a:pt x="253272" y="7311685"/>
+                          <a:pt x="342900" y="7125585"/>
+                        </a:cubicBezTo>
+                        <a:cubicBezTo>
+                          <a:pt x="344770" y="7197284"/>
+                          <a:pt x="337021" y="7241028"/>
+                          <a:pt x="342900" y="7297035"/>
+                        </a:cubicBezTo>
+                        <a:cubicBezTo>
+                          <a:pt x="949249" y="6891046"/>
+                          <a:pt x="1489969" y="5657055"/>
+                          <a:pt x="1370132" y="3878830"/>
+                        </a:cubicBezTo>
+                      </a:path>
+                      <a:path w="1371600" h="7929110" fill="none" stroke="0" extrusionOk="0">
+                        <a:moveTo>
+                          <a:pt x="1371600" y="4050280"/>
+                        </a:moveTo>
+                        <a:cubicBezTo>
+                          <a:pt x="1453417" y="1931116"/>
+                          <a:pt x="787342" y="202596"/>
+                          <a:pt x="0" y="342900"/>
+                        </a:cubicBezTo>
+                        <a:cubicBezTo>
+                          <a:pt x="24792" y="172885"/>
+                          <a:pt x="1218" y="35033"/>
+                          <a:pt x="0" y="0"/>
+                        </a:cubicBezTo>
+                        <a:cubicBezTo>
+                          <a:pt x="619677" y="-9784"/>
+                          <a:pt x="1354272" y="1624528"/>
+                          <a:pt x="1371600" y="3707380"/>
+                        </a:cubicBezTo>
+                        <a:cubicBezTo>
+                          <a:pt x="1341498" y="3837767"/>
+                          <a:pt x="1363905" y="3925989"/>
+                          <a:pt x="1371600" y="4050280"/>
+                        </a:cubicBezTo>
+                        <a:cubicBezTo>
+                          <a:pt x="1343677" y="5790766"/>
+                          <a:pt x="995845" y="7252486"/>
+                          <a:pt x="342900" y="7639935"/>
+                        </a:cubicBezTo>
+                        <a:cubicBezTo>
+                          <a:pt x="333001" y="7707034"/>
+                          <a:pt x="352516" y="7746827"/>
+                          <a:pt x="342900" y="7811385"/>
+                        </a:cubicBezTo>
+                        <a:cubicBezTo>
+                          <a:pt x="259365" y="7735320"/>
+                          <a:pt x="81396" y="7638197"/>
+                          <a:pt x="0" y="7586210"/>
+                        </a:cubicBezTo>
+                        <a:cubicBezTo>
+                          <a:pt x="33653" y="7509904"/>
+                          <a:pt x="256744" y="7205331"/>
+                          <a:pt x="342900" y="7125585"/>
+                        </a:cubicBezTo>
+                        <a:cubicBezTo>
+                          <a:pt x="353784" y="7202728"/>
+                          <a:pt x="342932" y="7273362"/>
+                          <a:pt x="342900" y="7297035"/>
+                        </a:cubicBezTo>
+                        <a:cubicBezTo>
+                          <a:pt x="1080591" y="7023648"/>
+                          <a:pt x="1260702" y="5750419"/>
+                          <a:pt x="1370132" y="3878830"/>
+                        </a:cubicBezTo>
+                      </a:path>
+                    </a:pathLst>
+                  </a:custGeom>
+                  <ask:type>
+                    <ask:lineSketchNone/>
+                  </ask:type>
+                </ask:lineSketchStyleProps>
+              </a:ext>
+            </a:extLst>
+          </a:ln>
+        </p:spPr>
+        <p:style>
+          <a:lnRef idx="2">
+            <a:schemeClr val="accent1">
+              <a:shade val="15000"/>
+            </a:schemeClr>
+          </a:lnRef>
+          <a:fillRef idx="1">
+            <a:schemeClr val="accent1"/>
+          </a:fillRef>
+          <a:effectRef idx="0">
+            <a:schemeClr val="accent1"/>
+          </a:effectRef>
+          <a:fontRef idx="minor">
+            <a:schemeClr val="lt1"/>
+          </a:fontRef>
+        </p:style>
+        <p:txBody>
+          <a:bodyPr rtlCol="0" anchor="ctr"/>
+          <a:lstStyle/>
+          <a:p>
+            <a:pPr algn="ctr"/>
+            <a:endParaRPr lang="en-US" dirty="0">
+              <a:solidFill>
+                <a:schemeClr val="tx1"/>
+              </a:solidFill>
+            </a:endParaRPr>
           </a:p>
         </p:txBody>
       </p:sp>

</xml_diff>